<commit_message>
Change a bit on slides
</commit_message>
<xml_diff>
--- a/lectures/lecture03.pptx
+++ b/lectures/lecture03.pptx
@@ -265,7 +265,7 @@
           <a:p>
             <a:fld id="{57CF08AD-F0F7-AE4B-B667-A82446B580D0}" type="datetimeFigureOut">
               <a:rPr lang="en-US" smtClean="0"/>
-              <a:t>3/2/2019</a:t>
+              <a:t>3/2/19</a:t>
             </a:fld>
             <a:endParaRPr lang="en-US"/>
           </a:p>
@@ -463,7 +463,7 @@
           <a:p>
             <a:fld id="{57CF08AD-F0F7-AE4B-B667-A82446B580D0}" type="datetimeFigureOut">
               <a:rPr lang="en-US" smtClean="0"/>
-              <a:t>3/2/2019</a:t>
+              <a:t>3/2/19</a:t>
             </a:fld>
             <a:endParaRPr lang="en-US"/>
           </a:p>
@@ -671,7 +671,7 @@
           <a:p>
             <a:fld id="{57CF08AD-F0F7-AE4B-B667-A82446B580D0}" type="datetimeFigureOut">
               <a:rPr lang="en-US" smtClean="0"/>
-              <a:t>3/2/2019</a:t>
+              <a:t>3/2/19</a:t>
             </a:fld>
             <a:endParaRPr lang="en-US"/>
           </a:p>
@@ -869,7 +869,7 @@
           <a:p>
             <a:fld id="{57CF08AD-F0F7-AE4B-B667-A82446B580D0}" type="datetimeFigureOut">
               <a:rPr lang="en-US" smtClean="0"/>
-              <a:t>3/2/2019</a:t>
+              <a:t>3/2/19</a:t>
             </a:fld>
             <a:endParaRPr lang="en-US"/>
           </a:p>
@@ -1144,7 +1144,7 @@
           <a:p>
             <a:fld id="{57CF08AD-F0F7-AE4B-B667-A82446B580D0}" type="datetimeFigureOut">
               <a:rPr lang="en-US" smtClean="0"/>
-              <a:t>3/2/2019</a:t>
+              <a:t>3/2/19</a:t>
             </a:fld>
             <a:endParaRPr lang="en-US"/>
           </a:p>
@@ -1409,7 +1409,7 @@
           <a:p>
             <a:fld id="{57CF08AD-F0F7-AE4B-B667-A82446B580D0}" type="datetimeFigureOut">
               <a:rPr lang="en-US" smtClean="0"/>
-              <a:t>3/2/2019</a:t>
+              <a:t>3/2/19</a:t>
             </a:fld>
             <a:endParaRPr lang="en-US"/>
           </a:p>
@@ -1821,7 +1821,7 @@
           <a:p>
             <a:fld id="{57CF08AD-F0F7-AE4B-B667-A82446B580D0}" type="datetimeFigureOut">
               <a:rPr lang="en-US" smtClean="0"/>
-              <a:t>3/2/2019</a:t>
+              <a:t>3/2/19</a:t>
             </a:fld>
             <a:endParaRPr lang="en-US"/>
           </a:p>
@@ -1962,7 +1962,7 @@
           <a:p>
             <a:fld id="{57CF08AD-F0F7-AE4B-B667-A82446B580D0}" type="datetimeFigureOut">
               <a:rPr lang="en-US" smtClean="0"/>
-              <a:t>3/2/2019</a:t>
+              <a:t>3/2/19</a:t>
             </a:fld>
             <a:endParaRPr lang="en-US"/>
           </a:p>
@@ -2075,7 +2075,7 @@
           <a:p>
             <a:fld id="{57CF08AD-F0F7-AE4B-B667-A82446B580D0}" type="datetimeFigureOut">
               <a:rPr lang="en-US" smtClean="0"/>
-              <a:t>3/2/2019</a:t>
+              <a:t>3/2/19</a:t>
             </a:fld>
             <a:endParaRPr lang="en-US"/>
           </a:p>
@@ -2386,7 +2386,7 @@
           <a:p>
             <a:fld id="{57CF08AD-F0F7-AE4B-B667-A82446B580D0}" type="datetimeFigureOut">
               <a:rPr lang="en-US" smtClean="0"/>
-              <a:t>3/2/2019</a:t>
+              <a:t>3/2/19</a:t>
             </a:fld>
             <a:endParaRPr lang="en-US"/>
           </a:p>
@@ -2674,7 +2674,7 @@
           <a:p>
             <a:fld id="{57CF08AD-F0F7-AE4B-B667-A82446B580D0}" type="datetimeFigureOut">
               <a:rPr lang="en-US" smtClean="0"/>
-              <a:t>3/2/2019</a:t>
+              <a:t>3/2/19</a:t>
             </a:fld>
             <a:endParaRPr lang="en-US"/>
           </a:p>
@@ -2915,7 +2915,7 @@
           <a:p>
             <a:fld id="{57CF08AD-F0F7-AE4B-B667-A82446B580D0}" type="datetimeFigureOut">
               <a:rPr lang="en-US" smtClean="0"/>
-              <a:t>3/2/2019</a:t>
+              <a:t>3/2/19</a:t>
             </a:fld>
             <a:endParaRPr lang="en-US"/>
           </a:p>
@@ -6984,7 +6984,7 @@
         <p:spPr>
           <a:xfrm>
             <a:off x="2832808" y="3476179"/>
-            <a:ext cx="7862922" cy="369332"/>
+            <a:ext cx="5092933" cy="369332"/>
           </a:xfrm>
           <a:prstGeom prst="rect">
             <a:avLst/>
@@ -7028,7 +7028,7 @@
                 <a:ea typeface="+mn-ea"/>
                 <a:cs typeface="+mn-cs"/>
               </a:rPr>
-              <a:t>本次作业内容较多，因些建议可以从示例代码中</a:t>
+              <a:t>建议可以从示例代码中</a:t>
             </a:r>
             <a:r>
               <a:rPr kumimoji="0" lang="en-US" altLang="zh-CN" sz="1800" b="0" i="0" u="none" strike="noStrike" kern="1200" cap="none" spc="0" normalizeH="0" baseline="0" noProof="0" dirty="0">

</xml_diff>